<commit_message>
little tweek on the logic
</commit_message>
<xml_diff>
--- a/python-preprocessor/output/preprocessed.pptx
+++ b/python-preprocessor/output/preprocessed.pptx
@@ -3369,7 +3369,7 @@
           <a:lstStyle/>
           <a:p>
             <a:r>
-              <a:t>{{TITLE}}</a:t>
+              <a:t>{{TITLE_SLIDE_1}}</a:t>
             </a:r>
           </a:p>
         </p:txBody>
@@ -3396,7 +3396,7 @@
           <a:lstStyle/>
           <a:p>
             <a:r>
-              <a:t>{{SUBTITLE}}</a:t>
+              <a:t>{{SUBTITLE_SLIDE_1}}</a:t>
             </a:r>
           </a:p>
         </p:txBody>
@@ -3453,7 +3453,7 @@
           <a:lstStyle/>
           <a:p>
             <a:r>
-              <a:t>{{TITLE}}</a:t>
+              <a:t>{{TITLE_SLIDE_2}}</a:t>
             </a:r>
           </a:p>
         </p:txBody>
@@ -3480,7 +3480,7 @@
           <a:lstStyle/>
           <a:p>
             <a:r>
-              <a:t>{{RIGHT_CONTENT_2}}</a:t>
+              <a:t>{{RIGHT_CONTENT_SLIDE_2_1}}</a:t>
             </a:r>
           </a:p>
         </p:txBody>
@@ -3537,7 +3537,7 @@
           <a:lstStyle/>
           <a:p>
             <a:r>
-              <a:t>{{TITLE}}</a:t>
+              <a:t>{{TITLE_SLIDE_3}}</a:t>
             </a:r>
           </a:p>
         </p:txBody>
@@ -3564,7 +3564,7 @@
           <a:lstStyle/>
           <a:p>
             <a:r>
-              <a:t>{{RIGHT_CONTENT_3}}</a:t>
+              <a:t>{{RIGHT_CONTENT_SLIDE_3_1}}</a:t>
             </a:r>
           </a:p>
         </p:txBody>
@@ -3621,7 +3621,7 @@
           <a:lstStyle/>
           <a:p>
             <a:r>
-              <a:t>{{TITLE}}</a:t>
+              <a:t>{{TITLE_SLIDE_4}}</a:t>
             </a:r>
           </a:p>
         </p:txBody>
@@ -3648,7 +3648,7 @@
           <a:lstStyle/>
           <a:p>
             <a:r>
-              <a:t>{{RIGHT_CONTENT_4}}</a:t>
+              <a:t>{{RIGHT_CONTENT_SLIDE_4_1}}</a:t>
             </a:r>
           </a:p>
         </p:txBody>
@@ -3705,7 +3705,7 @@
           <a:lstStyle/>
           <a:p>
             <a:r>
-              <a:t>{{TITLE}}</a:t>
+              <a:t>{{TITLE_SLIDE_5}}</a:t>
             </a:r>
           </a:p>
         </p:txBody>
@@ -3732,7 +3732,7 @@
           <a:lstStyle/>
           <a:p>
             <a:r>
-              <a:t>{{RIGHT_CONTENT_5}}</a:t>
+              <a:t>{{RIGHT_CONTENT_SLIDE_5_1}}</a:t>
             </a:r>
           </a:p>
         </p:txBody>
@@ -3789,7 +3789,7 @@
           <a:lstStyle/>
           <a:p>
             <a:r>
-              <a:t>{{TITLE}}</a:t>
+              <a:t>{{TITLE_SLIDE_6}}</a:t>
             </a:r>
           </a:p>
         </p:txBody>
@@ -3816,7 +3816,7 @@
           <a:lstStyle/>
           <a:p>
             <a:r>
-              <a:t>{{RIGHT_CONTENT_6}}</a:t>
+              <a:t>{{RIGHT_CONTENT_SLIDE_6_1}}</a:t>
             </a:r>
           </a:p>
         </p:txBody>

</xml_diff>